<commit_message>
updated  Zürich Parkflächen Zwischenpräsentation.pptx
added Visualizationexperiments
</commit_message>
<xml_diff>
--- a/Dokumente/Präsentationen/Zürich Parkflächen Zwischenpräsentation.pptx
+++ b/Dokumente/Präsentationen/Zürich Parkflächen Zwischenpräsentation.pptx
@@ -14,7 +14,7 @@
     <p:sldId id="269" r:id="rId5"/>
     <p:sldId id="270" r:id="rId6"/>
     <p:sldId id="272" r:id="rId7"/>
-    <p:sldId id="273" r:id="rId8"/>
+    <p:sldId id="276" r:id="rId8"/>
     <p:sldId id="274" r:id="rId9"/>
     <p:sldId id="275" r:id="rId10"/>
     <p:sldId id="268" r:id="rId11"/>
@@ -206,7 +206,7 @@
           <a:p>
             <a:fld id="{FBF8EF64-C69B-44B8-A820-9E7C542A5C5B}" type="datetimeFigureOut">
               <a:rPr lang="de-DE" smtClean="0"/>
-              <a:t>10.12.2016</a:t>
+              <a:t>13.12.2016</a:t>
             </a:fld>
             <a:endParaRPr lang="de-DE"/>
           </a:p>
@@ -824,7 +824,7 @@
           <a:p>
             <a:fld id="{703AAE7F-1B3A-4479-972D-702855497481}" type="datetime1">
               <a:rPr lang="de-DE" smtClean="0"/>
-              <a:t>10.12.2016</a:t>
+              <a:t>13.12.2016</a:t>
             </a:fld>
             <a:endParaRPr lang="de-DE"/>
           </a:p>
@@ -1165,7 +1165,7 @@
           <a:p>
             <a:fld id="{CB9753FE-E36E-4EDE-8D8F-594652052F86}" type="datetime1">
               <a:rPr lang="de-DE" smtClean="0"/>
-              <a:t>10.12.2016</a:t>
+              <a:t>13.12.2016</a:t>
             </a:fld>
             <a:endParaRPr lang="de-DE"/>
           </a:p>
@@ -1569,7 +1569,7 @@
           <a:p>
             <a:fld id="{FA4F471D-9EF9-49EF-A56A-11543EFB2CD0}" type="datetime1">
               <a:rPr lang="de-DE" smtClean="0"/>
-              <a:t>10.12.2016</a:t>
+              <a:t>13.12.2016</a:t>
             </a:fld>
             <a:endParaRPr lang="de-DE"/>
           </a:p>
@@ -1907,7 +1907,7 @@
           <a:p>
             <a:fld id="{4ED618DD-6B5F-4D3F-933A-B8E77183781F}" type="datetime1">
               <a:rPr lang="de-DE" smtClean="0"/>
-              <a:t>10.12.2016</a:t>
+              <a:t>13.12.2016</a:t>
             </a:fld>
             <a:endParaRPr lang="de-DE"/>
           </a:p>
@@ -2230,7 +2230,7 @@
           <a:p>
             <a:fld id="{C8652BC6-9D1E-4581-AE59-736E1627E963}" type="datetime1">
               <a:rPr lang="de-DE" smtClean="0"/>
-              <a:t>10.12.2016</a:t>
+              <a:t>13.12.2016</a:t>
             </a:fld>
             <a:endParaRPr lang="de-DE"/>
           </a:p>
@@ -2629,7 +2629,7 @@
           <a:p>
             <a:fld id="{A1972926-0679-4D55-95D4-BB447B28868C}" type="datetime1">
               <a:rPr lang="de-DE" smtClean="0"/>
-              <a:t>10.12.2016</a:t>
+              <a:t>13.12.2016</a:t>
             </a:fld>
             <a:endParaRPr lang="de-DE"/>
           </a:p>
@@ -2889,7 +2889,7 @@
           <a:p>
             <a:fld id="{090BCD8D-4288-4C18-BFA9-D42650CEA9D9}" type="datetime1">
               <a:rPr lang="de-DE" smtClean="0"/>
-              <a:t>10.12.2016</a:t>
+              <a:t>13.12.2016</a:t>
             </a:fld>
             <a:endParaRPr lang="de-DE"/>
           </a:p>
@@ -3154,7 +3154,7 @@
           <a:p>
             <a:fld id="{737D5893-7198-4394-AC87-C081DA7496F7}" type="datetime1">
               <a:rPr lang="de-DE" smtClean="0"/>
-              <a:t>10.12.2016</a:t>
+              <a:t>13.12.2016</a:t>
             </a:fld>
             <a:endParaRPr lang="de-DE"/>
           </a:p>
@@ -3419,7 +3419,7 @@
           <a:p>
             <a:fld id="{A0B92148-B8CE-4619-B16E-381F458364E3}" type="datetime1">
               <a:rPr lang="de-DE" smtClean="0"/>
-              <a:t>10.12.2016</a:t>
+              <a:t>13.12.2016</a:t>
             </a:fld>
             <a:endParaRPr lang="de-DE"/>
           </a:p>
@@ -3751,7 +3751,7 @@
           <a:p>
             <a:fld id="{70DECCED-8540-4872-9890-F97F80338968}" type="datetime1">
               <a:rPr lang="de-DE" smtClean="0"/>
-              <a:t>10.12.2016</a:t>
+              <a:t>13.12.2016</a:t>
             </a:fld>
             <a:endParaRPr lang="de-DE"/>
           </a:p>
@@ -4077,7 +4077,7 @@
           <a:p>
             <a:fld id="{C0DB3231-7CD6-46A7-B66F-873FD3695BAC}" type="datetime1">
               <a:rPr lang="de-DE" smtClean="0"/>
-              <a:t>10.12.2016</a:t>
+              <a:t>13.12.2016</a:t>
             </a:fld>
             <a:endParaRPr lang="de-DE"/>
           </a:p>
@@ -4537,7 +4537,7 @@
           <a:p>
             <a:fld id="{83196B8B-CE94-4A75-95AF-863620D4BD85}" type="datetime1">
               <a:rPr lang="de-DE" smtClean="0"/>
-              <a:t>10.12.2016</a:t>
+              <a:t>13.12.2016</a:t>
             </a:fld>
             <a:endParaRPr lang="de-DE"/>
           </a:p>
@@ -4745,7 +4745,7 @@
           <a:p>
             <a:fld id="{74156916-6F46-405E-B5D0-BB64C825424A}" type="datetime1">
               <a:rPr lang="de-DE" smtClean="0"/>
-              <a:t>10.12.2016</a:t>
+              <a:t>13.12.2016</a:t>
             </a:fld>
             <a:endParaRPr lang="de-DE"/>
           </a:p>
@@ -4925,7 +4925,7 @@
           <a:p>
             <a:fld id="{2659AFC6-A641-41CF-9029-7FF66805D379}" type="datetime1">
               <a:rPr lang="de-DE" smtClean="0"/>
-              <a:t>10.12.2016</a:t>
+              <a:t>13.12.2016</a:t>
             </a:fld>
             <a:endParaRPr lang="de-DE"/>
           </a:p>
@@ -5261,7 +5261,7 @@
           <a:p>
             <a:fld id="{C7B50E7F-C106-4584-813D-F59FF417010D}" type="datetime1">
               <a:rPr lang="de-DE" smtClean="0"/>
-              <a:t>10.12.2016</a:t>
+              <a:t>13.12.2016</a:t>
             </a:fld>
             <a:endParaRPr lang="de-DE"/>
           </a:p>
@@ -5609,7 +5609,7 @@
           <a:p>
             <a:fld id="{7AEEDE52-AFD4-4F93-AB33-21DEE11D5CDD}" type="datetime1">
               <a:rPr lang="de-DE" smtClean="0"/>
-              <a:t>10.12.2016</a:t>
+              <a:t>13.12.2016</a:t>
             </a:fld>
             <a:endParaRPr lang="de-DE"/>
           </a:p>
@@ -7729,7 +7729,7 @@
           <a:p>
             <a:fld id="{E38EC453-C864-4C3B-8697-492471DAE2CA}" type="datetime1">
               <a:rPr lang="de-DE" smtClean="0"/>
-              <a:t>10.12.2016</a:t>
+              <a:t>13.12.2016</a:t>
             </a:fld>
             <a:endParaRPr lang="de-DE"/>
           </a:p>
@@ -8290,7 +8290,13 @@
             <a:br>
               <a:rPr lang="de-DE" sz="3600" dirty="0"/>
             </a:br>
-            <a:endParaRPr lang="de-DE" sz="3600" dirty="0"/>
+            <a:br>
+              <a:rPr lang="de-DE" sz="3600" dirty="0"/>
+            </a:br>
+            <a:r>
+              <a:rPr lang="de-DE" sz="3600" dirty="0"/>
+              <a:t>Zwischenpräsentation</a:t>
+            </a:r>
           </a:p>
         </p:txBody>
       </p:sp>
@@ -8847,7 +8853,7 @@
           <a:p>
             <a:fld id="{BAFFCD11-BBAC-40D9-A6E5-555CB8D177B0}" type="datetime1">
               <a:rPr lang="de-DE" smtClean="0"/>
-              <a:t>10.12.2016</a:t>
+              <a:t>13.12.2016</a:t>
             </a:fld>
             <a:endParaRPr lang="de-DE"/>
           </a:p>
@@ -9066,7 +9072,7 @@
           <a:p>
             <a:fld id="{DA8DF6E3-DA87-42CF-80C8-AF6BEE065AE4}" type="datetime1">
               <a:rPr lang="de-DE" smtClean="0"/>
-              <a:t>10.12.2016</a:t>
+              <a:t>13.12.2016</a:t>
             </a:fld>
             <a:endParaRPr lang="de-DE"/>
           </a:p>
@@ -9254,7 +9260,7 @@
           <a:p>
             <a:fld id="{DA8DF6E3-DA87-42CF-80C8-AF6BEE065AE4}" type="datetime1">
               <a:rPr lang="de-DE" smtClean="0"/>
-              <a:t>10.12.2016</a:t>
+              <a:t>13.12.2016</a:t>
             </a:fld>
             <a:endParaRPr lang="de-DE"/>
           </a:p>
@@ -9373,7 +9379,7 @@
           <a:p>
             <a:fld id="{DA8DF6E3-DA87-42CF-80C8-AF6BEE065AE4}" type="datetime1">
               <a:rPr lang="de-DE" smtClean="0"/>
-              <a:t>10.12.2016</a:t>
+              <a:t>13.12.2016</a:t>
             </a:fld>
             <a:endParaRPr lang="de-DE"/>
           </a:p>
@@ -9871,7 +9877,7 @@
           <a:p>
             <a:fld id="{DA8DF6E3-DA87-42CF-80C8-AF6BEE065AE4}" type="datetime1">
               <a:rPr lang="de-DE" smtClean="0"/>
-              <a:t>10.12.2016</a:t>
+              <a:t>13.12.2016</a:t>
             </a:fld>
             <a:endParaRPr lang="de-DE"/>
           </a:p>
@@ -10276,36 +10282,43 @@
             <p:ph type="title"/>
           </p:nvPr>
         </p:nvSpPr>
+        <p:spPr>
+          <a:xfrm>
+            <a:off x="1836891" y="624110"/>
+            <a:ext cx="8860780" cy="1280890"/>
+          </a:xfrm>
+        </p:spPr>
+        <p:txBody>
+          <a:bodyPr>
+            <a:normAutofit/>
+          </a:bodyPr>
+          <a:lstStyle/>
+          <a:p>
+            <a:r>
+              <a:rPr lang="de-DE" dirty="0"/>
+              <a:t>Visualisierung – Experiment 1</a:t>
+            </a:r>
+          </a:p>
+        </p:txBody>
+      </p:sp>
+      <p:sp>
+        <p:nvSpPr>
+          <p:cNvPr id="4" name="Datumsplatzhalter 3"/>
+          <p:cNvSpPr>
+            <a:spLocks noGrp="1"/>
+          </p:cNvSpPr>
+          <p:nvPr>
+            <p:ph type="dt" sz="half" idx="10"/>
+          </p:nvPr>
+        </p:nvSpPr>
         <p:spPr/>
         <p:txBody>
           <a:bodyPr/>
           <a:lstStyle/>
           <a:p>
-            <a:r>
-              <a:rPr lang="de-DE" dirty="0"/>
-              <a:t>Visualisierung – Beispiel 1</a:t>
-            </a:r>
-          </a:p>
-        </p:txBody>
-      </p:sp>
-      <p:sp>
-        <p:nvSpPr>
-          <p:cNvPr id="4" name="Datumsplatzhalter 3"/>
-          <p:cNvSpPr>
-            <a:spLocks noGrp="1"/>
-          </p:cNvSpPr>
-          <p:nvPr>
-            <p:ph type="dt" sz="half" idx="10"/>
-          </p:nvPr>
-        </p:nvSpPr>
-        <p:spPr/>
-        <p:txBody>
-          <a:bodyPr/>
-          <a:lstStyle/>
-          <a:p>
             <a:fld id="{DA8DF6E3-DA87-42CF-80C8-AF6BEE065AE4}" type="datetime1">
               <a:rPr lang="de-DE" smtClean="0"/>
-              <a:t>10.12.2016</a:t>
+              <a:t>13.12.2016</a:t>
             </a:fld>
             <a:endParaRPr lang="de-DE"/>
           </a:p>
@@ -10599,6 +10612,36 @@
           </a:p>
         </p:txBody>
       </p:sp>
+      <p:pic>
+        <p:nvPicPr>
+          <p:cNvPr id="3" name="Grafik 2"/>
+          <p:cNvPicPr>
+            <a:picLocks noChangeAspect="1"/>
+          </p:cNvPicPr>
+          <p:nvPr/>
+        </p:nvPicPr>
+        <p:blipFill>
+          <a:blip r:embed="rId2">
+            <a:extLst>
+              <a:ext uri="{28A0092B-C50C-407E-A947-70E740481C1C}">
+                <a14:useLocalDpi xmlns:a14="http://schemas.microsoft.com/office/drawing/2010/main" val="0"/>
+              </a:ext>
+            </a:extLst>
+          </a:blip>
+          <a:stretch>
+            <a:fillRect/>
+          </a:stretch>
+        </p:blipFill>
+        <p:spPr>
+          <a:xfrm>
+            <a:off x="3989373" y="1254264"/>
+            <a:ext cx="5565298" cy="4981063"/>
+          </a:xfrm>
+          <a:prstGeom prst="rect">
+            <a:avLst/>
+          </a:prstGeom>
+        </p:spPr>
+      </p:pic>
     </p:spTree>
     <p:extLst>
       <p:ext uri="{BB962C8B-B14F-4D97-AF65-F5344CB8AC3E}">
@@ -10639,36 +10682,43 @@
             <p:ph type="title"/>
           </p:nvPr>
         </p:nvSpPr>
+        <p:spPr>
+          <a:xfrm>
+            <a:off x="1836891" y="624110"/>
+            <a:ext cx="9556695" cy="1280890"/>
+          </a:xfrm>
+        </p:spPr>
+        <p:txBody>
+          <a:bodyPr>
+            <a:normAutofit/>
+          </a:bodyPr>
+          <a:lstStyle/>
+          <a:p>
+            <a:r>
+              <a:rPr lang="de-DE" dirty="0"/>
+              <a:t>Visualisierung – Experiment 2</a:t>
+            </a:r>
+          </a:p>
+        </p:txBody>
+      </p:sp>
+      <p:sp>
+        <p:nvSpPr>
+          <p:cNvPr id="4" name="Datumsplatzhalter 3"/>
+          <p:cNvSpPr>
+            <a:spLocks noGrp="1"/>
+          </p:cNvSpPr>
+          <p:nvPr>
+            <p:ph type="dt" sz="half" idx="10"/>
+          </p:nvPr>
+        </p:nvSpPr>
         <p:spPr/>
         <p:txBody>
           <a:bodyPr/>
           <a:lstStyle/>
           <a:p>
-            <a:r>
-              <a:rPr lang="de-DE" dirty="0"/>
-              <a:t>Visualisierung – Beispiel 2</a:t>
-            </a:r>
-          </a:p>
-        </p:txBody>
-      </p:sp>
-      <p:sp>
-        <p:nvSpPr>
-          <p:cNvPr id="4" name="Datumsplatzhalter 3"/>
-          <p:cNvSpPr>
-            <a:spLocks noGrp="1"/>
-          </p:cNvSpPr>
-          <p:nvPr>
-            <p:ph type="dt" sz="half" idx="10"/>
-          </p:nvPr>
-        </p:nvSpPr>
-        <p:spPr/>
-        <p:txBody>
-          <a:bodyPr/>
-          <a:lstStyle/>
-          <a:p>
             <a:fld id="{DA8DF6E3-DA87-42CF-80C8-AF6BEE065AE4}" type="datetime1">
               <a:rPr lang="de-DE" smtClean="0"/>
-              <a:t>10.12.2016</a:t>
+              <a:t>13.12.2016</a:t>
             </a:fld>
             <a:endParaRPr lang="de-DE"/>
           </a:p>
@@ -10962,10 +11012,40 @@
           </a:p>
         </p:txBody>
       </p:sp>
+      <p:pic>
+        <p:nvPicPr>
+          <p:cNvPr id="6" name="Grafik 5"/>
+          <p:cNvPicPr>
+            <a:picLocks noChangeAspect="1"/>
+          </p:cNvPicPr>
+          <p:nvPr/>
+        </p:nvPicPr>
+        <p:blipFill>
+          <a:blip r:embed="rId2">
+            <a:extLst>
+              <a:ext uri="{28A0092B-C50C-407E-A947-70E740481C1C}">
+                <a14:useLocalDpi xmlns:a14="http://schemas.microsoft.com/office/drawing/2010/main" val="0"/>
+              </a:ext>
+            </a:extLst>
+          </a:blip>
+          <a:stretch>
+            <a:fillRect/>
+          </a:stretch>
+        </p:blipFill>
+        <p:spPr>
+          <a:xfrm>
+            <a:off x="3409830" y="1232693"/>
+            <a:ext cx="7596572" cy="5006266"/>
+          </a:xfrm>
+          <a:prstGeom prst="rect">
+            <a:avLst/>
+          </a:prstGeom>
+        </p:spPr>
+      </p:pic>
     </p:spTree>
     <p:extLst>
       <p:ext uri="{BB962C8B-B14F-4D97-AF65-F5344CB8AC3E}">
-        <p14:creationId xmlns:p14="http://schemas.microsoft.com/office/powerpoint/2010/main" val="2162804289"/>
+        <p14:creationId xmlns:p14="http://schemas.microsoft.com/office/powerpoint/2010/main" val="2626473056"/>
       </p:ext>
     </p:extLst>
   </p:cSld>
@@ -11031,7 +11111,7 @@
           <a:p>
             <a:fld id="{DA8DF6E3-DA87-42CF-80C8-AF6BEE065AE4}" type="datetime1">
               <a:rPr lang="de-DE" smtClean="0"/>
-              <a:t>10.12.2016</a:t>
+              <a:t>13.12.2016</a:t>
             </a:fld>
             <a:endParaRPr lang="de-DE"/>
           </a:p>
@@ -11431,7 +11511,7 @@
           <a:p>
             <a:fld id="{DA8DF6E3-DA87-42CF-80C8-AF6BEE065AE4}" type="datetime1">
               <a:rPr lang="de-DE" smtClean="0"/>
-              <a:t>10.12.2016</a:t>
+              <a:t>13.12.2016</a:t>
             </a:fld>
             <a:endParaRPr lang="de-DE"/>
           </a:p>

</xml_diff>